<commit_message>
Actualizado el ppt de sockets
</commit_message>
<xml_diff>
--- a/Documentos/Sockets en Frontend.pptx
+++ b/Documentos/Sockets en Frontend.pptx
@@ -18,6 +18,7 @@
     <p:sldId id="267" r:id="rId15"/>
     <p:sldId id="266" r:id="rId16"/>
     <p:sldId id="268" r:id="rId17"/>
+    <p:sldId id="269" r:id="rId18"/>
   </p:sldIdLst>
   <p:sldSz cx="12192000" cy="6858000"/>
   <p:notesSz cx="6858000" cy="9144000"/>
@@ -116,6 +117,11 @@
       </a:defRPr>
     </a:lvl9pPr>
   </p:defaultTextStyle>
+  <p:extLst>
+    <p:ext uri="{EFAFB233-063F-42B5-8137-9DF3F51BA10A}">
+      <p15:sldGuideLst xmlns:p15="http://schemas.microsoft.com/office/powerpoint/2012/main"/>
+    </p:ext>
+  </p:extLst>
 </p:presentation>
 </file>
 
@@ -13133,6 +13139,116 @@
 </p:sld>
 </file>
 
+<file path=ppt/slides/slide14.xml><?xml version="1.0" encoding="utf-8"?>
+<p:sld xmlns:a="http://schemas.openxmlformats.org/drawingml/2006/main" xmlns:r="http://schemas.openxmlformats.org/officeDocument/2006/relationships" xmlns:p="http://schemas.openxmlformats.org/presentationml/2006/main">
+  <p:cSld>
+    <p:spTree>
+      <p:nvGrpSpPr>
+        <p:cNvPr id="1" name=""/>
+        <p:cNvGrpSpPr/>
+        <p:nvPr/>
+      </p:nvGrpSpPr>
+      <p:grpSpPr>
+        <a:xfrm>
+          <a:off x="0" y="0"/>
+          <a:ext cx="0" cy="0"/>
+          <a:chOff x="0" y="0"/>
+          <a:chExt cx="0" cy="0"/>
+        </a:xfrm>
+      </p:grpSpPr>
+      <p:sp>
+        <p:nvSpPr>
+          <p:cNvPr id="2" name="Título 1">
+            <a:extLst>
+              <a:ext uri="{FF2B5EF4-FFF2-40B4-BE49-F238E27FC236}">
+                <a16:creationId xmlns:a16="http://schemas.microsoft.com/office/drawing/2014/main" id="{7FED0A08-4017-9B4E-8ABE-70E1ED990174}"/>
+              </a:ext>
+            </a:extLst>
+          </p:cNvPr>
+          <p:cNvSpPr>
+            <a:spLocks noGrp="1"/>
+          </p:cNvSpPr>
+          <p:nvPr>
+            <p:ph type="title"/>
+          </p:nvPr>
+        </p:nvSpPr>
+        <p:spPr/>
+        <p:txBody>
+          <a:bodyPr/>
+          <a:lstStyle/>
+          <a:p>
+            <a:r>
+              <a:rPr lang="es-ES" dirty="0"/>
+              <a:t>Suscripciones de </a:t>
+            </a:r>
+            <a:r>
+              <a:rPr lang="es-ES" dirty="0" err="1"/>
+              <a:t>socket.on</a:t>
+            </a:r>
+            <a:r>
+              <a:rPr lang="es-ES" dirty="0"/>
+              <a:t>() en el frontend</a:t>
+            </a:r>
+            <a:endParaRPr lang="es-AR" dirty="0"/>
+          </a:p>
+        </p:txBody>
+      </p:sp>
+      <p:pic>
+        <p:nvPicPr>
+          <p:cNvPr id="5" name="Imagen 4">
+            <a:extLst>
+              <a:ext uri="{FF2B5EF4-FFF2-40B4-BE49-F238E27FC236}">
+                <a16:creationId xmlns:a16="http://schemas.microsoft.com/office/drawing/2014/main" id="{FF93F2AD-0201-B8F4-06BC-7F27839836E9}"/>
+              </a:ext>
+            </a:extLst>
+          </p:cNvPr>
+          <p:cNvPicPr>
+            <a:picLocks noChangeAspect="1"/>
+          </p:cNvPicPr>
+          <p:nvPr/>
+        </p:nvPicPr>
+        <p:blipFill>
+          <a:blip r:embed="rId2"/>
+          <a:stretch>
+            <a:fillRect/>
+          </a:stretch>
+        </p:blipFill>
+        <p:spPr>
+          <a:xfrm>
+            <a:off x="2045079" y="2059439"/>
+            <a:ext cx="7039957" cy="3801005"/>
+          </a:xfrm>
+          <a:prstGeom prst="roundRect">
+            <a:avLst>
+              <a:gd name="adj" fmla="val 8594"/>
+            </a:avLst>
+          </a:prstGeom>
+          <a:solidFill>
+            <a:srgbClr val="FFFFFF">
+              <a:shade val="85000"/>
+            </a:srgbClr>
+          </a:solidFill>
+          <a:ln>
+            <a:noFill/>
+          </a:ln>
+          <a:effectLst>
+            <a:reflection blurRad="12700" stA="38000" endPos="28000" dist="5000" dir="5400000" sy="-100000" algn="bl" rotWithShape="0"/>
+          </a:effectLst>
+        </p:spPr>
+      </p:pic>
+    </p:spTree>
+    <p:extLst>
+      <p:ext uri="{BB962C8B-B14F-4D97-AF65-F5344CB8AC3E}">
+        <p14:creationId xmlns:p14="http://schemas.microsoft.com/office/powerpoint/2010/main" val="3389695644"/>
+      </p:ext>
+    </p:extLst>
+  </p:cSld>
+  <p:clrMapOvr>
+    <a:masterClrMapping/>
+  </p:clrMapOvr>
+</p:sld>
+</file>
+
 <file path=ppt/slides/slide2.xml><?xml version="1.0" encoding="utf-8"?>
 <p:sld xmlns:a="http://schemas.openxmlformats.org/drawingml/2006/main" xmlns:r="http://schemas.openxmlformats.org/officeDocument/2006/relationships" xmlns:p="http://schemas.openxmlformats.org/presentationml/2006/main">
   <p:cSld>
@@ -16566,6 +16682,21 @@
 </file>
 
 <file path=customXml/item1.xml><?xml version="1.0" encoding="utf-8"?>
+<p:properties xmlns:p="http://schemas.microsoft.com/office/2006/metadata/properties" xmlns:xsi="http://www.w3.org/2001/XMLSchema-instance" xmlns:pc="http://schemas.microsoft.com/office/infopath/2007/PartnerControls">
+  <documentManagement/>
+</p:properties>
+</file>
+
+<file path=customXml/item2.xml><?xml version="1.0" encoding="utf-8"?>
+<?mso-contentType ?>
+<FormTemplates xmlns="http://schemas.microsoft.com/sharepoint/v3/contenttype/forms">
+  <Display>DocumentLibraryForm</Display>
+  <Edit>DocumentLibraryForm</Edit>
+  <New>DocumentLibraryForm</New>
+</FormTemplates>
+</file>
+
+<file path=customXml/item3.xml><?xml version="1.0" encoding="utf-8"?>
 <ct:contentTypeSchema xmlns:ct="http://schemas.microsoft.com/office/2006/metadata/contentType" xmlns:ma="http://schemas.microsoft.com/office/2006/metadata/properties/metaAttributes" ct:_="" ma:_="" ma:contentTypeName="Document" ma:contentTypeID="0x010100C8733208C828A0409B88C3F13BDC33A0" ma:contentTypeVersion="5" ma:contentTypeDescription="Create a new document." ma:contentTypeScope="" ma:versionID="38bba1c15ad1922f57f93ef3781fa1d7">
   <xsd:schema xmlns:xsd="http://www.w3.org/2001/XMLSchema" xmlns:xs="http://www.w3.org/2001/XMLSchema" xmlns:p="http://schemas.microsoft.com/office/2006/metadata/properties" xmlns:ns3="0c3b2162-9bab-4fc9-97d6-f987dde52638" targetNamespace="http://schemas.microsoft.com/office/2006/metadata/properties" ma:root="true" ma:fieldsID="7356a0eae53ee752f8d7b954607a8c38" ns3:_="">
     <xsd:import namespace="0c3b2162-9bab-4fc9-97d6-f987dde52638"/>
@@ -16715,22 +16846,31 @@
 </ct:contentTypeSchema>
 </file>
 
-<file path=customXml/item2.xml><?xml version="1.0" encoding="utf-8"?>
-<?mso-contentType ?>
-<FormTemplates xmlns="http://schemas.microsoft.com/sharepoint/v3/contenttype/forms">
-  <Display>DocumentLibraryForm</Display>
-  <Edit>DocumentLibraryForm</Edit>
-  <New>DocumentLibraryForm</New>
-</FormTemplates>
+<file path=customXml/itemProps1.xml><?xml version="1.0" encoding="utf-8"?>
+<ds:datastoreItem xmlns:ds="http://schemas.openxmlformats.org/officeDocument/2006/customXml" ds:itemID="{41270D76-7563-4EBE-9734-537B1DF9735D}">
+  <ds:schemaRefs>
+    <ds:schemaRef ds:uri="http://www.w3.org/XML/1998/namespace"/>
+    <ds:schemaRef ds:uri="http://schemas.microsoft.com/office/2006/documentManagement/types"/>
+    <ds:schemaRef ds:uri="http://purl.org/dc/elements/1.1/"/>
+    <ds:schemaRef ds:uri="http://schemas.microsoft.com/office/2006/metadata/properties"/>
+    <ds:schemaRef ds:uri="http://purl.org/dc/terms/"/>
+    <ds:schemaRef ds:uri="0c3b2162-9bab-4fc9-97d6-f987dde52638"/>
+    <ds:schemaRef ds:uri="http://schemas.microsoft.com/office/infopath/2007/PartnerControls"/>
+    <ds:schemaRef ds:uri="http://schemas.openxmlformats.org/package/2006/metadata/core-properties"/>
+    <ds:schemaRef ds:uri="http://purl.org/dc/dcmitype/"/>
+  </ds:schemaRefs>
+</ds:datastoreItem>
 </file>
 
-<file path=customXml/item3.xml><?xml version="1.0" encoding="utf-8"?>
-<p:properties xmlns:p="http://schemas.microsoft.com/office/2006/metadata/properties" xmlns:xsi="http://www.w3.org/2001/XMLSchema-instance" xmlns:pc="http://schemas.microsoft.com/office/infopath/2007/PartnerControls">
-  <documentManagement/>
-</p:properties>
+<file path=customXml/itemProps2.xml><?xml version="1.0" encoding="utf-8"?>
+<ds:datastoreItem xmlns:ds="http://schemas.openxmlformats.org/officeDocument/2006/customXml" ds:itemID="{01BC0094-3A88-4AE3-959E-D84FB37B98AA}">
+  <ds:schemaRefs>
+    <ds:schemaRef ds:uri="http://schemas.microsoft.com/sharepoint/v3/contenttype/forms"/>
+  </ds:schemaRefs>
+</ds:datastoreItem>
 </file>
 
-<file path=customXml/itemProps1.xml><?xml version="1.0" encoding="utf-8"?>
+<file path=customXml/itemProps3.xml><?xml version="1.0" encoding="utf-8"?>
 <ds:datastoreItem xmlns:ds="http://schemas.openxmlformats.org/officeDocument/2006/customXml" ds:itemID="{47C0B7D1-C728-4A42-B0A6-A34157092F5E}">
   <ds:schemaRefs>
     <ds:schemaRef ds:uri="http://schemas.microsoft.com/office/2006/metadata/contentType"/>
@@ -16746,28 +16886,4 @@
     <ds:schemaRef ds:uri="http://schemas.microsoft.com/internal/obd"/>
   </ds:schemaRefs>
 </ds:datastoreItem>
-</file>
-
-<file path=customXml/itemProps2.xml><?xml version="1.0" encoding="utf-8"?>
-<ds:datastoreItem xmlns:ds="http://schemas.openxmlformats.org/officeDocument/2006/customXml" ds:itemID="{01BC0094-3A88-4AE3-959E-D84FB37B98AA}">
-  <ds:schemaRefs>
-    <ds:schemaRef ds:uri="http://schemas.microsoft.com/sharepoint/v3/contenttype/forms"/>
-  </ds:schemaRefs>
-</ds:datastoreItem>
-</file>
-
-<file path=customXml/itemProps3.xml><?xml version="1.0" encoding="utf-8"?>
-<ds:datastoreItem xmlns:ds="http://schemas.openxmlformats.org/officeDocument/2006/customXml" ds:itemID="{41270D76-7563-4EBE-9734-537B1DF9735D}">
-  <ds:schemaRefs>
-    <ds:schemaRef ds:uri="http://www.w3.org/XML/1998/namespace"/>
-    <ds:schemaRef ds:uri="http://schemas.microsoft.com/office/2006/documentManagement/types"/>
-    <ds:schemaRef ds:uri="http://purl.org/dc/elements/1.1/"/>
-    <ds:schemaRef ds:uri="http://schemas.microsoft.com/office/2006/metadata/properties"/>
-    <ds:schemaRef ds:uri="http://purl.org/dc/terms/"/>
-    <ds:schemaRef ds:uri="0c3b2162-9bab-4fc9-97d6-f987dde52638"/>
-    <ds:schemaRef ds:uri="http://schemas.microsoft.com/office/infopath/2007/PartnerControls"/>
-    <ds:schemaRef ds:uri="http://schemas.openxmlformats.org/package/2006/metadata/core-properties"/>
-    <ds:schemaRef ds:uri="http://purl.org/dc/dcmitype/"/>
-  </ds:schemaRefs>
-</ds:datastoreItem>
 </file>
</xml_diff>